<commit_message>
/ ‘firewalls/Firewalling in FreeBSD-v1.pptx’
</commit_message>
<xml_diff>
--- a/firewalls/Firewalling in FreeBSD-v1.pptx
+++ b/firewalls/Firewalling in FreeBSD-v1.pptx
@@ -5629,18 +5629,18 @@
             </a:r>
           </a:p>
           <a:p>
-            <a:pPr>
+            <a:pPr lvl="1">
               <a:buNone/>
             </a:pPr>
             <a:r>
-              <a:rPr lang="en-US" sz="2600" dirty="0" err="1" smtClean="0">
+              <a:rPr lang="en-US" sz="1600" dirty="0" err="1" smtClean="0">
                 <a:latin typeface="Courier"/>
                 <a:cs typeface="Courier"/>
               </a:rPr>
               <a:t>ext_if</a:t>
             </a:r>
             <a:r>
-              <a:rPr lang="en-US" sz="2600" dirty="0" smtClean="0">
+              <a:rPr lang="en-US" sz="1600" dirty="0" smtClean="0">
                 <a:latin typeface="Courier"/>
                 <a:cs typeface="Courier"/>
               </a:rPr>
@@ -5648,18 +5648,18 @@
             </a:r>
           </a:p>
           <a:p>
-            <a:pPr>
+            <a:pPr lvl="1">
               <a:buNone/>
             </a:pPr>
             <a:r>
-              <a:rPr lang="en-US" sz="2600" dirty="0" err="1" smtClean="0">
+              <a:rPr lang="en-US" sz="1600" dirty="0" err="1" smtClean="0">
                 <a:latin typeface="Courier"/>
                 <a:cs typeface="Courier"/>
               </a:rPr>
               <a:t>int_if</a:t>
             </a:r>
             <a:r>
-              <a:rPr lang="en-US" sz="2600" dirty="0" smtClean="0">
+              <a:rPr lang="en-US" sz="1600" dirty="0" smtClean="0">
                 <a:latin typeface="Courier"/>
                 <a:cs typeface="Courier"/>
               </a:rPr>
@@ -5667,11 +5667,11 @@
             </a:r>
           </a:p>
           <a:p>
-            <a:pPr>
+            <a:pPr lvl="1">
               <a:buNone/>
             </a:pPr>
             <a:r>
-              <a:rPr lang="en-US" sz="2600" dirty="0" smtClean="0">
+              <a:rPr lang="en-US" sz="1600" dirty="0" smtClean="0">
                 <a:latin typeface="Courier"/>
                 <a:cs typeface="Courier"/>
               </a:rPr>
@@ -5679,18 +5679,18 @@
             </a:r>
           </a:p>
           <a:p>
-            <a:pPr>
+            <a:pPr lvl="1">
               <a:buNone/>
             </a:pPr>
             <a:r>
-              <a:rPr lang="en-US" sz="2600" dirty="0" err="1" smtClean="0">
+              <a:rPr lang="en-US" sz="1600" dirty="0" err="1" smtClean="0">
                 <a:latin typeface="Courier"/>
                 <a:cs typeface="Courier"/>
               </a:rPr>
               <a:t>good_ports</a:t>
             </a:r>
             <a:r>
-              <a:rPr lang="en-US" sz="2600" dirty="0" smtClean="0">
+              <a:rPr lang="en-US" sz="1600" dirty="0" smtClean="0">
                 <a:latin typeface="Courier"/>
                 <a:cs typeface="Courier"/>
               </a:rPr>
@@ -5698,18 +5698,18 @@
             </a:r>
           </a:p>
           <a:p>
-            <a:pPr>
+            <a:pPr lvl="1">
               <a:buNone/>
             </a:pPr>
             <a:r>
-              <a:rPr lang="en-US" sz="2600" dirty="0" err="1" smtClean="0">
+              <a:rPr lang="en-US" sz="1600" dirty="0" err="1" smtClean="0">
                 <a:latin typeface="Courier"/>
                 <a:cs typeface="Courier"/>
               </a:rPr>
               <a:t>bad_ips</a:t>
             </a:r>
             <a:r>
-              <a:rPr lang="en-US" sz="2600" dirty="0" smtClean="0">
+              <a:rPr lang="en-US" sz="1600" dirty="0" smtClean="0">
                 <a:latin typeface="Courier"/>
                 <a:cs typeface="Courier"/>
               </a:rPr>
@@ -5717,23 +5717,64 @@
             </a:r>
           </a:p>
           <a:p>
-            <a:pPr>
+            <a:pPr lvl="1">
               <a:buNone/>
             </a:pPr>
             <a:r>
-              <a:rPr lang="en-US" sz="2600" dirty="0" err="1" smtClean="0">
+              <a:rPr lang="en-US" sz="1600" dirty="0" err="1" smtClean="0">
                 <a:latin typeface="Courier"/>
                 <a:cs typeface="Courier"/>
               </a:rPr>
               <a:t>my_pc</a:t>
             </a:r>
             <a:r>
-              <a:rPr lang="en-US" sz="2600" dirty="0" smtClean="0">
+              <a:rPr lang="en-US" sz="1600" dirty="0" smtClean="0">
                 <a:latin typeface="Courier"/>
                 <a:cs typeface="Courier"/>
               </a:rPr>
-              <a:t>=“172.16.1.1”</a:t>
-            </a:r>
+              <a:t>=“172.16.1.1</a:t>
+            </a:r>
+            <a:r>
+              <a:rPr lang="en-US" sz="1600" dirty="0" smtClean="0">
+                <a:latin typeface="Courier"/>
+                <a:cs typeface="Courier"/>
+              </a:rPr>
+              <a:t>”</a:t>
+            </a:r>
+          </a:p>
+          <a:p>
+            <a:r>
+              <a:rPr lang="en-US" dirty="0"/>
+              <a:t>Macros cannot contain a </a:t>
+            </a:r>
+            <a:r>
+              <a:rPr lang="en-US" dirty="0" smtClean="0"/>
+              <a:t>hyphen however</a:t>
+            </a:r>
+          </a:p>
+          <a:p>
+            <a:pPr lvl="1"/>
+            <a:r>
+              <a:rPr lang="en-US" dirty="0" smtClean="0"/>
+              <a:t>so </a:t>
+            </a:r>
+            <a:r>
+              <a:rPr lang="en-US" dirty="0" err="1" smtClean="0"/>
+              <a:t>ext</a:t>
+            </a:r>
+            <a:r>
+              <a:rPr lang="en-US" dirty="0" smtClean="0"/>
+              <a:t>-if=“em0” will </a:t>
+            </a:r>
+            <a:r>
+              <a:rPr lang="en-US" smtClean="0"/>
+              <a:t>not work</a:t>
+            </a:r>
+            <a:endParaRPr lang="en-US" dirty="0" smtClean="0"/>
+          </a:p>
+          <a:p>
+            <a:pPr lvl="1"/>
+            <a:endParaRPr lang="en-US" dirty="0"/>
           </a:p>
           <a:p>
             <a:endParaRPr lang="en-US" dirty="0"/>
@@ -5813,6 +5854,13 @@
               <a:rPr lang="en-US" dirty="0" err="1" smtClean="0"/>
               <a:t>ruleset</a:t>
             </a:r>
+            <a:r>
+              <a:rPr lang="en-US" dirty="0" smtClean="0"/>
+              <a:t>:</a:t>
+            </a:r>
+            <a:br>
+              <a:rPr lang="en-US" dirty="0" smtClean="0"/>
+            </a:br>
             <a:endParaRPr lang="en-US" dirty="0" smtClean="0"/>
           </a:p>
           <a:p>
@@ -5824,7 +5872,14 @@
                 <a:latin typeface="Courier"/>
                 <a:cs typeface="Courier"/>
               </a:rPr>
-              <a:t>block in all</a:t>
+              <a:t>block </a:t>
+            </a:r>
+            <a:r>
+              <a:rPr lang="en-US" sz="2000" dirty="0" smtClean="0">
+                <a:latin typeface="Courier"/>
+                <a:cs typeface="Courier"/>
+              </a:rPr>
+              <a:t>in all</a:t>
             </a:r>
           </a:p>
           <a:p>
@@ -5951,6 +6006,18 @@
               </a:rPr>
               <a:t>bad_ips</a:t>
             </a:r>
+            <a:r>
+              <a:rPr lang="en-US" sz="2000" dirty="0" smtClean="0">
+                <a:latin typeface="Courier"/>
+                <a:cs typeface="Courier"/>
+              </a:rPr>
+              <a:t>\</a:t>
+            </a:r>
+          </a:p>
+          <a:p>
+            <a:pPr marL="0" indent="0">
+              <a:buNone/>
+            </a:pPr>
             <a:endParaRPr lang="en-US" sz="2000" dirty="0">
               <a:latin typeface="Courier"/>
               <a:cs typeface="Courier"/>

</xml_diff>

<commit_message>
/ ‘firewalls/Firewalling in FreeBSD-v1.pptx’ + ‘firewalls/FreeBSD-firewalls.pdf’ / ‘firewalls/firewall-exercise-2.txt’
</commit_message>
<xml_diff>
--- a/firewalls/Firewalling in FreeBSD-v1.pptx
+++ b/firewalls/Firewalling in FreeBSD-v1.pptx
@@ -4911,11 +4911,7 @@
           <a:p>
             <a:r>
               <a:rPr lang="en-US" dirty="0" smtClean="0"/>
-              <a:t>A matching pass rule in one direction automatically creates a matching pass rule in the other </a:t>
-            </a:r>
-            <a:r>
-              <a:rPr lang="en-US" dirty="0" smtClean="0"/>
-              <a:t>direction</a:t>
+              <a:t>A matching pass rule in one direction automatically creates a matching pass rule in the other direction</a:t>
             </a:r>
           </a:p>
           <a:p>
@@ -7763,26 +7759,78 @@
         </p:nvSpPr>
         <p:spPr/>
         <p:txBody>
-          <a:bodyPr/>
-          <a:lstStyle/>
-          <a:p>
-            <a:r>
-              <a:rPr lang="en-US" dirty="0" smtClean="0"/>
-              <a:t>Put the “block in all” at the top so that all traffic that you do not specify is dropped</a:t>
-            </a:r>
-          </a:p>
-          <a:p>
-            <a:r>
-              <a:rPr lang="en-US" dirty="0" smtClean="0"/>
-              <a:t>Allow traffic that your server initiates “pass in all”</a:t>
+          <a:bodyPr>
+            <a:normAutofit fontScale="85000" lnSpcReduction="20000"/>
+          </a:bodyPr>
+          <a:lstStyle/>
+          <a:p>
+            <a:r>
+              <a:rPr lang="en-US" dirty="0" smtClean="0"/>
+              <a:t>Put your Macros at the top</a:t>
             </a:r>
           </a:p>
           <a:p>
             <a:pPr lvl="1"/>
             <a:r>
               <a:rPr lang="en-US" dirty="0" smtClean="0"/>
-              <a:t>However if the machine gets compromised, for example, is hacked and is used to attack other networks, you will have to change this rule</a:t>
-            </a:r>
+              <a:t>If you are on IPv6 add a macro for link local (fe80::/10)</a:t>
+            </a:r>
+          </a:p>
+          <a:p>
+            <a:r>
+              <a:rPr lang="en-US" dirty="0" smtClean="0"/>
+              <a:t>Skip the lo0 – </a:t>
+            </a:r>
+            <a:r>
+              <a:rPr lang="en-US" b="1" dirty="0" smtClean="0"/>
+              <a:t>set skip on lo0</a:t>
+            </a:r>
+          </a:p>
+          <a:p>
+            <a:r>
+              <a:rPr lang="en-US" dirty="0" smtClean="0"/>
+              <a:t>Put </a:t>
+            </a:r>
+            <a:r>
+              <a:rPr lang="en-US" dirty="0" smtClean="0"/>
+              <a:t>the “block in all” at the top so that all traffic that you do not specify is dropped</a:t>
+            </a:r>
+          </a:p>
+          <a:p>
+            <a:r>
+              <a:rPr lang="en-US" dirty="0" smtClean="0"/>
+              <a:t>Allow traffic that your server initiates “pass </a:t>
+            </a:r>
+            <a:r>
+              <a:rPr lang="en-US" dirty="0" smtClean="0"/>
+              <a:t>out</a:t>
+            </a:r>
+            <a:r>
+              <a:rPr lang="en-US" dirty="0" smtClean="0"/>
+              <a:t> </a:t>
+            </a:r>
+            <a:r>
+              <a:rPr lang="en-US" dirty="0" smtClean="0"/>
+              <a:t>all”</a:t>
+            </a:r>
+          </a:p>
+          <a:p>
+            <a:pPr lvl="1"/>
+            <a:r>
+              <a:rPr lang="en-US" dirty="0" smtClean="0"/>
+              <a:t>However if the machine gets compromised, for example, is hacked and is used to attack other networks, you will have to change this </a:t>
+            </a:r>
+            <a:r>
+              <a:rPr lang="en-US" dirty="0" smtClean="0"/>
+              <a:t>rule</a:t>
+            </a:r>
+          </a:p>
+          <a:p>
+            <a:r>
+              <a:rPr lang="en-US" dirty="0" smtClean="0"/>
+              <a:t>Allow link local addresses (if you are on an IPv6 network)</a:t>
+            </a:r>
+            <a:endParaRPr lang="en-US" dirty="0" smtClean="0"/>
           </a:p>
           <a:p>
             <a:r>

</xml_diff>